<commit_message>
various edits for intro incl fig
</commit_message>
<xml_diff>
--- a/Main figures/fig1-sup-sketch.pptx
+++ b/Main figures/fig1-sup-sketch.pptx
@@ -104,6 +104,11 @@
       </a:defRPr>
     </a:lvl9pPr>
   </p:defaultTextStyle>
+  <p:extLst>
+    <p:ext uri="{EFAFB233-063F-42B5-8137-9DF3F51BA10A}">
+      <p15:sldGuideLst xmlns:p15="http://schemas.microsoft.com/office/powerpoint/2012/main"/>
+    </p:ext>
+  </p:extLst>
 </p:presentation>
 </file>
 
@@ -238,7 +243,7 @@
           <a:p>
             <a:fld id="{62F28B94-1C21-420D-B146-10F377ADC67A}" type="datetimeFigureOut">
               <a:rPr lang="en-US" smtClean="0"/>
-              <a:t>7/1/2025</a:t>
+              <a:t>7/2/2025</a:t>
             </a:fld>
             <a:endParaRPr lang="en-US"/>
           </a:p>
@@ -408,7 +413,7 @@
           <a:p>
             <a:fld id="{62F28B94-1C21-420D-B146-10F377ADC67A}" type="datetimeFigureOut">
               <a:rPr lang="en-US" smtClean="0"/>
-              <a:t>7/1/2025</a:t>
+              <a:t>7/2/2025</a:t>
             </a:fld>
             <a:endParaRPr lang="en-US"/>
           </a:p>
@@ -588,7 +593,7 @@
           <a:p>
             <a:fld id="{62F28B94-1C21-420D-B146-10F377ADC67A}" type="datetimeFigureOut">
               <a:rPr lang="en-US" smtClean="0"/>
-              <a:t>7/1/2025</a:t>
+              <a:t>7/2/2025</a:t>
             </a:fld>
             <a:endParaRPr lang="en-US"/>
           </a:p>
@@ -758,7 +763,7 @@
           <a:p>
             <a:fld id="{62F28B94-1C21-420D-B146-10F377ADC67A}" type="datetimeFigureOut">
               <a:rPr lang="en-US" smtClean="0"/>
-              <a:t>7/1/2025</a:t>
+              <a:t>7/2/2025</a:t>
             </a:fld>
             <a:endParaRPr lang="en-US"/>
           </a:p>
@@ -1004,7 +1009,7 @@
           <a:p>
             <a:fld id="{62F28B94-1C21-420D-B146-10F377ADC67A}" type="datetimeFigureOut">
               <a:rPr lang="en-US" smtClean="0"/>
-              <a:t>7/1/2025</a:t>
+              <a:t>7/2/2025</a:t>
             </a:fld>
             <a:endParaRPr lang="en-US"/>
           </a:p>
@@ -1236,7 +1241,7 @@
           <a:p>
             <a:fld id="{62F28B94-1C21-420D-B146-10F377ADC67A}" type="datetimeFigureOut">
               <a:rPr lang="en-US" smtClean="0"/>
-              <a:t>7/1/2025</a:t>
+              <a:t>7/2/2025</a:t>
             </a:fld>
             <a:endParaRPr lang="en-US"/>
           </a:p>
@@ -1603,7 +1608,7 @@
           <a:p>
             <a:fld id="{62F28B94-1C21-420D-B146-10F377ADC67A}" type="datetimeFigureOut">
               <a:rPr lang="en-US" smtClean="0"/>
-              <a:t>7/1/2025</a:t>
+              <a:t>7/2/2025</a:t>
             </a:fld>
             <a:endParaRPr lang="en-US"/>
           </a:p>
@@ -1721,7 +1726,7 @@
           <a:p>
             <a:fld id="{62F28B94-1C21-420D-B146-10F377ADC67A}" type="datetimeFigureOut">
               <a:rPr lang="en-US" smtClean="0"/>
-              <a:t>7/1/2025</a:t>
+              <a:t>7/2/2025</a:t>
             </a:fld>
             <a:endParaRPr lang="en-US"/>
           </a:p>
@@ -1816,7 +1821,7 @@
           <a:p>
             <a:fld id="{62F28B94-1C21-420D-B146-10F377ADC67A}" type="datetimeFigureOut">
               <a:rPr lang="en-US" smtClean="0"/>
-              <a:t>7/1/2025</a:t>
+              <a:t>7/2/2025</a:t>
             </a:fld>
             <a:endParaRPr lang="en-US"/>
           </a:p>
@@ -2093,7 +2098,7 @@
           <a:p>
             <a:fld id="{62F28B94-1C21-420D-B146-10F377ADC67A}" type="datetimeFigureOut">
               <a:rPr lang="en-US" smtClean="0"/>
-              <a:t>7/1/2025</a:t>
+              <a:t>7/2/2025</a:t>
             </a:fld>
             <a:endParaRPr lang="en-US"/>
           </a:p>
@@ -2350,7 +2355,7 @@
           <a:p>
             <a:fld id="{62F28B94-1C21-420D-B146-10F377ADC67A}" type="datetimeFigureOut">
               <a:rPr lang="en-US" smtClean="0"/>
-              <a:t>7/1/2025</a:t>
+              <a:t>7/2/2025</a:t>
             </a:fld>
             <a:endParaRPr lang="en-US"/>
           </a:p>
@@ -2563,7 +2568,7 @@
           <a:p>
             <a:fld id="{62F28B94-1C21-420D-B146-10F377ADC67A}" type="datetimeFigureOut">
               <a:rPr lang="en-US" smtClean="0"/>
-              <a:t>7/1/2025</a:t>
+              <a:t>7/2/2025</a:t>
             </a:fld>
             <a:endParaRPr lang="en-US"/>
           </a:p>
@@ -2984,6 +2989,7 @@
         </p:nvPicPr>
         <p:blipFill>
           <a:blip r:embed="rId2"/>
+          <a:srcRect r="75444"/>
           <a:stretch>
             <a:fillRect/>
           </a:stretch>
@@ -2991,7 +2997,7 @@
         <p:spPr>
           <a:xfrm>
             <a:off x="235013" y="590238"/>
-            <a:ext cx="6281783" cy="1238259"/>
+            <a:ext cx="1542504" cy="1238259"/>
           </a:xfrm>
           <a:prstGeom prst="rect">
             <a:avLst/>
@@ -3228,7 +3234,7 @@
         </p:nvCxnSpPr>
         <p:spPr>
           <a:xfrm flipV="1">
-            <a:off x="3263921" y="2753124"/>
+            <a:off x="4079896" y="2807099"/>
             <a:ext cx="0" cy="1136650"/>
           </a:xfrm>
           <a:prstGeom prst="line">
@@ -3954,50 +3960,6 @@
           </a:fontRef>
         </p:style>
       </p:cxnSp>
-      <p:cxnSp>
-        <p:nvCxnSpPr>
-          <p:cNvPr id="47" name="Straight Connector 46">
-            <a:extLst>
-              <a:ext uri="{FF2B5EF4-FFF2-40B4-BE49-F238E27FC236}">
-                <a16:creationId xmlns:a16="http://schemas.microsoft.com/office/drawing/2014/main" id="{099E1101-7694-4E87-80D6-C6FBC164D3E0}"/>
-              </a:ext>
-            </a:extLst>
-          </p:cNvPr>
-          <p:cNvCxnSpPr>
-            <a:cxnSpLocks/>
-            <a:stCxn id="44" idx="1"/>
-          </p:cNvCxnSpPr>
-          <p:nvPr/>
-        </p:nvCxnSpPr>
-        <p:spPr>
-          <a:xfrm flipH="1" flipV="1">
-            <a:off x="1343807" y="1714864"/>
-            <a:ext cx="1440674" cy="888306"/>
-          </a:xfrm>
-          <a:prstGeom prst="line">
-            <a:avLst/>
-          </a:prstGeom>
-          <a:ln w="12700">
-            <a:solidFill>
-              <a:srgbClr val="F57E33"/>
-            </a:solidFill>
-          </a:ln>
-        </p:spPr>
-        <p:style>
-          <a:lnRef idx="2">
-            <a:schemeClr val="accent1"/>
-          </a:lnRef>
-          <a:fillRef idx="0">
-            <a:schemeClr val="accent1"/>
-          </a:fillRef>
-          <a:effectRef idx="1">
-            <a:schemeClr val="accent1"/>
-          </a:effectRef>
-          <a:fontRef idx="minor">
-            <a:schemeClr val="tx1"/>
-          </a:fontRef>
-        </p:style>
-      </p:cxnSp>
       <p:sp>
         <p:nvSpPr>
           <p:cNvPr id="49" name="Right Brace 48">
@@ -4012,8 +3974,8 @@
         </p:nvSpPr>
         <p:spPr>
           <a:xfrm rot="16200000">
-            <a:off x="3131226" y="2555152"/>
-            <a:ext cx="65617" cy="148951"/>
+            <a:off x="3122935" y="2563442"/>
+            <a:ext cx="56787" cy="123539"/>
           </a:xfrm>
           <a:prstGeom prst="rightBrace">
             <a:avLst/>
@@ -4047,50 +4009,6 @@
           </a:p>
         </p:txBody>
       </p:sp>
-      <p:cxnSp>
-        <p:nvCxnSpPr>
-          <p:cNvPr id="50" name="Straight Connector 49">
-            <a:extLst>
-              <a:ext uri="{FF2B5EF4-FFF2-40B4-BE49-F238E27FC236}">
-                <a16:creationId xmlns:a16="http://schemas.microsoft.com/office/drawing/2014/main" id="{86AE41ED-A110-E2D4-27F5-7C4B0B4EF0FA}"/>
-              </a:ext>
-            </a:extLst>
-          </p:cNvPr>
-          <p:cNvCxnSpPr>
-            <a:cxnSpLocks/>
-            <a:stCxn id="49" idx="1"/>
-          </p:cNvCxnSpPr>
-          <p:nvPr/>
-        </p:nvCxnSpPr>
-        <p:spPr>
-          <a:xfrm flipH="1" flipV="1">
-            <a:off x="1420274" y="1692275"/>
-            <a:ext cx="1743761" cy="904544"/>
-          </a:xfrm>
-          <a:prstGeom prst="line">
-            <a:avLst/>
-          </a:prstGeom>
-          <a:ln w="12700">
-            <a:solidFill>
-              <a:srgbClr val="A1D291"/>
-            </a:solidFill>
-          </a:ln>
-        </p:spPr>
-        <p:style>
-          <a:lnRef idx="2">
-            <a:schemeClr val="accent1"/>
-          </a:lnRef>
-          <a:fillRef idx="0">
-            <a:schemeClr val="accent1"/>
-          </a:fillRef>
-          <a:effectRef idx="1">
-            <a:schemeClr val="accent1"/>
-          </a:effectRef>
-          <a:fontRef idx="minor">
-            <a:schemeClr val="tx1"/>
-          </a:fontRef>
-        </p:style>
-      </p:cxnSp>
       <p:cxnSp>
         <p:nvCxnSpPr>
           <p:cNvPr id="54" name="Straight Connector 53">
@@ -4177,6 +4095,591 @@
           </a:fontRef>
         </p:style>
       </p:cxnSp>
+      <p:cxnSp>
+        <p:nvCxnSpPr>
+          <p:cNvPr id="2" name="Straight Connector 1">
+            <a:extLst>
+              <a:ext uri="{FF2B5EF4-FFF2-40B4-BE49-F238E27FC236}">
+                <a16:creationId xmlns:a16="http://schemas.microsoft.com/office/drawing/2014/main" id="{97AC284E-2123-FBB0-A719-4E41E94F932D}"/>
+              </a:ext>
+            </a:extLst>
+          </p:cNvPr>
+          <p:cNvCxnSpPr>
+            <a:cxnSpLocks/>
+          </p:cNvCxnSpPr>
+          <p:nvPr/>
+        </p:nvCxnSpPr>
+        <p:spPr>
+          <a:xfrm flipV="1">
+            <a:off x="3252259" y="2514600"/>
+            <a:ext cx="0" cy="1372500"/>
+          </a:xfrm>
+          <a:prstGeom prst="line">
+            <a:avLst/>
+          </a:prstGeom>
+          <a:ln w="12700">
+            <a:solidFill>
+              <a:srgbClr val="A1D291"/>
+            </a:solidFill>
+          </a:ln>
+        </p:spPr>
+        <p:style>
+          <a:lnRef idx="2">
+            <a:schemeClr val="accent1"/>
+          </a:lnRef>
+          <a:fillRef idx="0">
+            <a:schemeClr val="accent1"/>
+          </a:fillRef>
+          <a:effectRef idx="1">
+            <a:schemeClr val="accent1"/>
+          </a:effectRef>
+          <a:fontRef idx="minor">
+            <a:schemeClr val="tx1"/>
+          </a:fontRef>
+        </p:style>
+      </p:cxnSp>
+      <p:sp>
+        <p:nvSpPr>
+          <p:cNvPr id="26" name="Right Brace 25">
+            <a:extLst>
+              <a:ext uri="{FF2B5EF4-FFF2-40B4-BE49-F238E27FC236}">
+                <a16:creationId xmlns:a16="http://schemas.microsoft.com/office/drawing/2014/main" id="{85CC9AA1-6E01-273E-8E3C-551A7F0C13D2}"/>
+              </a:ext>
+            </a:extLst>
+          </p:cNvPr>
+          <p:cNvSpPr/>
+          <p:nvPr/>
+        </p:nvSpPr>
+        <p:spPr>
+          <a:xfrm rot="16200000">
+            <a:off x="3294385" y="2566617"/>
+            <a:ext cx="56787" cy="123539"/>
+          </a:xfrm>
+          <a:prstGeom prst="rightBrace">
+            <a:avLst/>
+          </a:prstGeom>
+          <a:ln w="12700">
+            <a:solidFill>
+              <a:srgbClr val="A1D291"/>
+            </a:solidFill>
+          </a:ln>
+        </p:spPr>
+        <p:style>
+          <a:lnRef idx="2">
+            <a:schemeClr val="accent1"/>
+          </a:lnRef>
+          <a:fillRef idx="0">
+            <a:schemeClr val="accent1"/>
+          </a:fillRef>
+          <a:effectRef idx="1">
+            <a:schemeClr val="accent1"/>
+          </a:effectRef>
+          <a:fontRef idx="minor">
+            <a:schemeClr val="tx1"/>
+          </a:fontRef>
+        </p:style>
+        <p:txBody>
+          <a:bodyPr rtlCol="0" anchor="ctr"/>
+          <a:lstStyle/>
+          <a:p>
+            <a:pPr algn="ctr"/>
+            <a:endParaRPr lang="en-US" dirty="0"/>
+          </a:p>
+        </p:txBody>
+      </p:sp>
+      <p:pic>
+        <p:nvPicPr>
+          <p:cNvPr id="40" name="Picture 39">
+            <a:extLst>
+              <a:ext uri="{FF2B5EF4-FFF2-40B4-BE49-F238E27FC236}">
+                <a16:creationId xmlns:a16="http://schemas.microsoft.com/office/drawing/2014/main" id="{25B512DE-E33A-7A32-95C7-03D01F013237}"/>
+              </a:ext>
+            </a:extLst>
+          </p:cNvPr>
+          <p:cNvPicPr>
+            <a:picLocks noChangeAspect="1"/>
+          </p:cNvPicPr>
+          <p:nvPr/>
+        </p:nvPicPr>
+        <p:blipFill>
+          <a:blip r:embed="rId2"/>
+          <a:srcRect l="18211" t="20538" r="74982" b="11302"/>
+          <a:stretch>
+            <a:fillRect/>
+          </a:stretch>
+        </p:blipFill>
+        <p:spPr>
+          <a:xfrm>
+            <a:off x="2843360" y="844550"/>
+            <a:ext cx="427576" cy="843993"/>
+          </a:xfrm>
+          <a:prstGeom prst="rect">
+            <a:avLst/>
+          </a:prstGeom>
+        </p:spPr>
+      </p:pic>
+      <p:sp>
+        <p:nvSpPr>
+          <p:cNvPr id="41" name="Rectangle 40">
+            <a:extLst>
+              <a:ext uri="{FF2B5EF4-FFF2-40B4-BE49-F238E27FC236}">
+                <a16:creationId xmlns:a16="http://schemas.microsoft.com/office/drawing/2014/main" id="{67CD4371-2A45-BB0F-A5ED-439F760A5DD5}"/>
+              </a:ext>
+            </a:extLst>
+          </p:cNvPr>
+          <p:cNvSpPr/>
+          <p:nvPr/>
+        </p:nvSpPr>
+        <p:spPr>
+          <a:xfrm>
+            <a:off x="1383342" y="667872"/>
+            <a:ext cx="427576" cy="294480"/>
+          </a:xfrm>
+          <a:prstGeom prst="rect">
+            <a:avLst/>
+          </a:prstGeom>
+          <a:solidFill>
+            <a:schemeClr val="bg1"/>
+          </a:solidFill>
+          <a:ln>
+            <a:noFill/>
+          </a:ln>
+        </p:spPr>
+        <p:style>
+          <a:lnRef idx="2">
+            <a:schemeClr val="accent1">
+              <a:shade val="15000"/>
+            </a:schemeClr>
+          </a:lnRef>
+          <a:fillRef idx="1">
+            <a:schemeClr val="accent1"/>
+          </a:fillRef>
+          <a:effectRef idx="0">
+            <a:schemeClr val="accent1"/>
+          </a:effectRef>
+          <a:fontRef idx="minor">
+            <a:schemeClr val="lt1"/>
+          </a:fontRef>
+        </p:style>
+        <p:txBody>
+          <a:bodyPr rtlCol="0" anchor="ctr"/>
+          <a:lstStyle/>
+          <a:p>
+            <a:pPr algn="ctr"/>
+            <a:endParaRPr lang="en-US"/>
+          </a:p>
+        </p:txBody>
+      </p:sp>
+      <p:sp>
+        <p:nvSpPr>
+          <p:cNvPr id="48" name="Rectangle 47">
+            <a:extLst>
+              <a:ext uri="{FF2B5EF4-FFF2-40B4-BE49-F238E27FC236}">
+                <a16:creationId xmlns:a16="http://schemas.microsoft.com/office/drawing/2014/main" id="{3EB64709-2068-B1F1-0A74-3E8638A7A404}"/>
+              </a:ext>
+            </a:extLst>
+          </p:cNvPr>
+          <p:cNvSpPr/>
+          <p:nvPr/>
+        </p:nvSpPr>
+        <p:spPr>
+          <a:xfrm>
+            <a:off x="1398141" y="1570092"/>
+            <a:ext cx="427576" cy="294480"/>
+          </a:xfrm>
+          <a:prstGeom prst="rect">
+            <a:avLst/>
+          </a:prstGeom>
+          <a:solidFill>
+            <a:schemeClr val="bg1"/>
+          </a:solidFill>
+          <a:ln>
+            <a:noFill/>
+          </a:ln>
+        </p:spPr>
+        <p:style>
+          <a:lnRef idx="2">
+            <a:schemeClr val="accent1">
+              <a:shade val="15000"/>
+            </a:schemeClr>
+          </a:lnRef>
+          <a:fillRef idx="1">
+            <a:schemeClr val="accent1"/>
+          </a:fillRef>
+          <a:effectRef idx="0">
+            <a:schemeClr val="accent1"/>
+          </a:effectRef>
+          <a:fontRef idx="minor">
+            <a:schemeClr val="lt1"/>
+          </a:fontRef>
+        </p:style>
+        <p:txBody>
+          <a:bodyPr rtlCol="0" anchor="ctr"/>
+          <a:lstStyle/>
+          <a:p>
+            <a:pPr algn="ctr"/>
+            <a:endParaRPr lang="en-US"/>
+          </a:p>
+        </p:txBody>
+      </p:sp>
+      <p:cxnSp>
+        <p:nvCxnSpPr>
+          <p:cNvPr id="47" name="Straight Connector 46">
+            <a:extLst>
+              <a:ext uri="{FF2B5EF4-FFF2-40B4-BE49-F238E27FC236}">
+                <a16:creationId xmlns:a16="http://schemas.microsoft.com/office/drawing/2014/main" id="{099E1101-7694-4E87-80D6-C6FBC164D3E0}"/>
+              </a:ext>
+            </a:extLst>
+          </p:cNvPr>
+          <p:cNvCxnSpPr>
+            <a:cxnSpLocks/>
+            <a:stCxn id="44" idx="1"/>
+          </p:cNvCxnSpPr>
+          <p:nvPr/>
+        </p:nvCxnSpPr>
+        <p:spPr>
+          <a:xfrm flipH="1" flipV="1">
+            <a:off x="1343807" y="1714864"/>
+            <a:ext cx="1440674" cy="888306"/>
+          </a:xfrm>
+          <a:prstGeom prst="line">
+            <a:avLst/>
+          </a:prstGeom>
+          <a:ln w="12700">
+            <a:solidFill>
+              <a:srgbClr val="F57E33"/>
+            </a:solidFill>
+          </a:ln>
+        </p:spPr>
+        <p:style>
+          <a:lnRef idx="2">
+            <a:schemeClr val="accent1"/>
+          </a:lnRef>
+          <a:fillRef idx="0">
+            <a:schemeClr val="accent1"/>
+          </a:fillRef>
+          <a:effectRef idx="1">
+            <a:schemeClr val="accent1"/>
+          </a:effectRef>
+          <a:fontRef idx="minor">
+            <a:schemeClr val="tx1"/>
+          </a:fontRef>
+        </p:style>
+      </p:cxnSp>
+      <p:cxnSp>
+        <p:nvCxnSpPr>
+          <p:cNvPr id="50" name="Straight Connector 49">
+            <a:extLst>
+              <a:ext uri="{FF2B5EF4-FFF2-40B4-BE49-F238E27FC236}">
+                <a16:creationId xmlns:a16="http://schemas.microsoft.com/office/drawing/2014/main" id="{86AE41ED-A110-E2D4-27F5-7C4B0B4EF0FA}"/>
+              </a:ext>
+            </a:extLst>
+          </p:cNvPr>
+          <p:cNvCxnSpPr>
+            <a:cxnSpLocks/>
+            <a:stCxn id="49" idx="1"/>
+          </p:cNvCxnSpPr>
+          <p:nvPr/>
+        </p:nvCxnSpPr>
+        <p:spPr>
+          <a:xfrm flipH="1" flipV="1">
+            <a:off x="2875810" y="1721260"/>
+            <a:ext cx="275519" cy="875558"/>
+          </a:xfrm>
+          <a:prstGeom prst="line">
+            <a:avLst/>
+          </a:prstGeom>
+          <a:ln w="12700">
+            <a:solidFill>
+              <a:srgbClr val="A1D291"/>
+            </a:solidFill>
+          </a:ln>
+        </p:spPr>
+        <p:style>
+          <a:lnRef idx="2">
+            <a:schemeClr val="accent1"/>
+          </a:lnRef>
+          <a:fillRef idx="0">
+            <a:schemeClr val="accent1"/>
+          </a:fillRef>
+          <a:effectRef idx="1">
+            <a:schemeClr val="accent1"/>
+          </a:effectRef>
+          <a:fontRef idx="minor">
+            <a:schemeClr val="tx1"/>
+          </a:fontRef>
+        </p:style>
+      </p:cxnSp>
+      <p:cxnSp>
+        <p:nvCxnSpPr>
+          <p:cNvPr id="13" name="Straight Connector 12">
+            <a:extLst>
+              <a:ext uri="{FF2B5EF4-FFF2-40B4-BE49-F238E27FC236}">
+                <a16:creationId xmlns:a16="http://schemas.microsoft.com/office/drawing/2014/main" id="{721B78C4-159B-313F-41BA-C9099829BC18}"/>
+              </a:ext>
+            </a:extLst>
+          </p:cNvPr>
+          <p:cNvCxnSpPr>
+            <a:cxnSpLocks/>
+            <a:endCxn id="18" idx="1"/>
+          </p:cNvCxnSpPr>
+          <p:nvPr/>
+        </p:nvCxnSpPr>
+        <p:spPr>
+          <a:xfrm flipH="1" flipV="1">
+            <a:off x="3008505" y="1804057"/>
+            <a:ext cx="243754" cy="710543"/>
+          </a:xfrm>
+          <a:prstGeom prst="line">
+            <a:avLst/>
+          </a:prstGeom>
+          <a:ln w="12700">
+            <a:solidFill>
+              <a:srgbClr val="A1D291"/>
+            </a:solidFill>
+          </a:ln>
+        </p:spPr>
+        <p:style>
+          <a:lnRef idx="2">
+            <a:schemeClr val="accent1"/>
+          </a:lnRef>
+          <a:fillRef idx="0">
+            <a:schemeClr val="accent1"/>
+          </a:fillRef>
+          <a:effectRef idx="1">
+            <a:schemeClr val="accent1"/>
+          </a:effectRef>
+          <a:fontRef idx="minor">
+            <a:schemeClr val="tx1"/>
+          </a:fontRef>
+        </p:style>
+      </p:cxnSp>
+      <p:cxnSp>
+        <p:nvCxnSpPr>
+          <p:cNvPr id="27" name="Straight Connector 26">
+            <a:extLst>
+              <a:ext uri="{FF2B5EF4-FFF2-40B4-BE49-F238E27FC236}">
+                <a16:creationId xmlns:a16="http://schemas.microsoft.com/office/drawing/2014/main" id="{6322F65A-A324-1CEC-40B1-05293478FF46}"/>
+              </a:ext>
+            </a:extLst>
+          </p:cNvPr>
+          <p:cNvCxnSpPr>
+            <a:cxnSpLocks/>
+            <a:stCxn id="26" idx="1"/>
+            <a:endCxn id="22" idx="1"/>
+          </p:cNvCxnSpPr>
+          <p:nvPr/>
+        </p:nvCxnSpPr>
+        <p:spPr>
+          <a:xfrm flipH="1" flipV="1">
+            <a:off x="3213350" y="1807231"/>
+            <a:ext cx="109429" cy="792762"/>
+          </a:xfrm>
+          <a:prstGeom prst="line">
+            <a:avLst/>
+          </a:prstGeom>
+          <a:ln w="12700">
+            <a:solidFill>
+              <a:srgbClr val="A1D291"/>
+            </a:solidFill>
+          </a:ln>
+        </p:spPr>
+        <p:style>
+          <a:lnRef idx="2">
+            <a:schemeClr val="accent1"/>
+          </a:lnRef>
+          <a:fillRef idx="0">
+            <a:schemeClr val="accent1"/>
+          </a:fillRef>
+          <a:effectRef idx="1">
+            <a:schemeClr val="accent1"/>
+          </a:effectRef>
+          <a:fontRef idx="minor">
+            <a:schemeClr val="tx1"/>
+          </a:fontRef>
+        </p:style>
+      </p:cxnSp>
+      <p:pic>
+        <p:nvPicPr>
+          <p:cNvPr id="51" name="Picture 50">
+            <a:extLst>
+              <a:ext uri="{FF2B5EF4-FFF2-40B4-BE49-F238E27FC236}">
+                <a16:creationId xmlns:a16="http://schemas.microsoft.com/office/drawing/2014/main" id="{C4CA48CA-48D5-326B-5797-A587682A3D54}"/>
+              </a:ext>
+            </a:extLst>
+          </p:cNvPr>
+          <p:cNvPicPr>
+            <a:picLocks noChangeAspect="1"/>
+          </p:cNvPicPr>
+          <p:nvPr/>
+        </p:nvPicPr>
+        <p:blipFill>
+          <a:blip r:embed="rId2"/>
+          <a:srcRect l="25066"/>
+          <a:stretch>
+            <a:fillRect/>
+          </a:stretch>
+        </p:blipFill>
+        <p:spPr>
+          <a:xfrm>
+            <a:off x="3744534" y="603895"/>
+            <a:ext cx="4707165" cy="1238259"/>
+          </a:xfrm>
+          <a:prstGeom prst="rect">
+            <a:avLst/>
+          </a:prstGeom>
+        </p:spPr>
+      </p:pic>
+      <p:sp>
+        <p:nvSpPr>
+          <p:cNvPr id="18" name="Right Brace 17">
+            <a:extLst>
+              <a:ext uri="{FF2B5EF4-FFF2-40B4-BE49-F238E27FC236}">
+                <a16:creationId xmlns:a16="http://schemas.microsoft.com/office/drawing/2014/main" id="{6B3904BA-A243-1026-C974-BFCD96C1B308}"/>
+              </a:ext>
+            </a:extLst>
+          </p:cNvPr>
+          <p:cNvSpPr/>
+          <p:nvPr/>
+        </p:nvSpPr>
+        <p:spPr>
+          <a:xfrm rot="5400000" flipV="1">
+            <a:off x="2977554" y="1637313"/>
+            <a:ext cx="61901" cy="271586"/>
+          </a:xfrm>
+          <a:prstGeom prst="rightBrace">
+            <a:avLst/>
+          </a:prstGeom>
+          <a:ln w="12700">
+            <a:solidFill>
+              <a:srgbClr val="A1D291"/>
+            </a:solidFill>
+          </a:ln>
+        </p:spPr>
+        <p:style>
+          <a:lnRef idx="2">
+            <a:schemeClr val="accent1"/>
+          </a:lnRef>
+          <a:fillRef idx="0">
+            <a:schemeClr val="accent1"/>
+          </a:fillRef>
+          <a:effectRef idx="1">
+            <a:schemeClr val="accent1"/>
+          </a:effectRef>
+          <a:fontRef idx="minor">
+            <a:schemeClr val="tx1"/>
+          </a:fontRef>
+        </p:style>
+        <p:txBody>
+          <a:bodyPr rtlCol="0" anchor="ctr"/>
+          <a:lstStyle/>
+          <a:p>
+            <a:pPr algn="ctr"/>
+            <a:endParaRPr lang="en-US" dirty="0"/>
+          </a:p>
+        </p:txBody>
+      </p:sp>
+      <p:sp>
+        <p:nvSpPr>
+          <p:cNvPr id="22" name="Right Brace 21">
+            <a:extLst>
+              <a:ext uri="{FF2B5EF4-FFF2-40B4-BE49-F238E27FC236}">
+                <a16:creationId xmlns:a16="http://schemas.microsoft.com/office/drawing/2014/main" id="{5F8D84DD-5606-94CE-7DB0-9D6CBC862663}"/>
+              </a:ext>
+            </a:extLst>
+          </p:cNvPr>
+          <p:cNvSpPr/>
+          <p:nvPr/>
+        </p:nvSpPr>
+        <p:spPr>
+          <a:xfrm rot="5400000" flipV="1">
+            <a:off x="3176130" y="1711943"/>
+            <a:ext cx="74439" cy="116137"/>
+          </a:xfrm>
+          <a:prstGeom prst="rightBrace">
+            <a:avLst/>
+          </a:prstGeom>
+          <a:ln w="12700">
+            <a:solidFill>
+              <a:srgbClr val="A1D291"/>
+            </a:solidFill>
+          </a:ln>
+        </p:spPr>
+        <p:style>
+          <a:lnRef idx="2">
+            <a:schemeClr val="accent1"/>
+          </a:lnRef>
+          <a:fillRef idx="0">
+            <a:schemeClr val="accent1"/>
+          </a:fillRef>
+          <a:effectRef idx="1">
+            <a:schemeClr val="accent1"/>
+          </a:effectRef>
+          <a:fontRef idx="minor">
+            <a:schemeClr val="tx1"/>
+          </a:fontRef>
+        </p:style>
+        <p:txBody>
+          <a:bodyPr rtlCol="0" anchor="ctr"/>
+          <a:lstStyle/>
+          <a:p>
+            <a:pPr algn="ctr"/>
+            <a:endParaRPr lang="en-US" dirty="0"/>
+          </a:p>
+        </p:txBody>
+      </p:sp>
+      <p:sp>
+        <p:nvSpPr>
+          <p:cNvPr id="60" name="Rectangle 59">
+            <a:extLst>
+              <a:ext uri="{FF2B5EF4-FFF2-40B4-BE49-F238E27FC236}">
+                <a16:creationId xmlns:a16="http://schemas.microsoft.com/office/drawing/2014/main" id="{C6F34610-58DD-A620-88E5-9892D81700D4}"/>
+              </a:ext>
+            </a:extLst>
+          </p:cNvPr>
+          <p:cNvSpPr/>
+          <p:nvPr/>
+        </p:nvSpPr>
+        <p:spPr>
+          <a:xfrm>
+            <a:off x="2737570" y="963071"/>
+            <a:ext cx="427576" cy="294480"/>
+          </a:xfrm>
+          <a:prstGeom prst="rect">
+            <a:avLst/>
+          </a:prstGeom>
+          <a:solidFill>
+            <a:schemeClr val="bg1"/>
+          </a:solidFill>
+          <a:ln>
+            <a:noFill/>
+          </a:ln>
+        </p:spPr>
+        <p:style>
+          <a:lnRef idx="2">
+            <a:schemeClr val="accent1">
+              <a:shade val="15000"/>
+            </a:schemeClr>
+          </a:lnRef>
+          <a:fillRef idx="1">
+            <a:schemeClr val="accent1"/>
+          </a:fillRef>
+          <a:effectRef idx="0">
+            <a:schemeClr val="accent1"/>
+          </a:effectRef>
+          <a:fontRef idx="minor">
+            <a:schemeClr val="lt1"/>
+          </a:fontRef>
+        </p:style>
+        <p:txBody>
+          <a:bodyPr rtlCol="0" anchor="ctr"/>
+          <a:lstStyle/>
+          <a:p>
+            <a:pPr algn="ctr"/>
+            <a:endParaRPr lang="en-US"/>
+          </a:p>
+        </p:txBody>
+      </p:sp>
     </p:spTree>
     <p:extLst>
       <p:ext uri="{BB962C8B-B14F-4D97-AF65-F5344CB8AC3E}">

</xml_diff>

<commit_message>
file cleanup / edits to intro of manuscript
</commit_message>
<xml_diff>
--- a/Main figures/fig1-sup-sketch.pptx
+++ b/Main figures/fig1-sup-sketch.pptx
@@ -243,7 +243,7 @@
           <a:p>
             <a:fld id="{62F28B94-1C21-420D-B146-10F377ADC67A}" type="datetimeFigureOut">
               <a:rPr lang="en-US" smtClean="0"/>
-              <a:t>7/2/2025</a:t>
+              <a:t>7/17/2025</a:t>
             </a:fld>
             <a:endParaRPr lang="en-US"/>
           </a:p>
@@ -413,7 +413,7 @@
           <a:p>
             <a:fld id="{62F28B94-1C21-420D-B146-10F377ADC67A}" type="datetimeFigureOut">
               <a:rPr lang="en-US" smtClean="0"/>
-              <a:t>7/2/2025</a:t>
+              <a:t>7/17/2025</a:t>
             </a:fld>
             <a:endParaRPr lang="en-US"/>
           </a:p>
@@ -593,7 +593,7 @@
           <a:p>
             <a:fld id="{62F28B94-1C21-420D-B146-10F377ADC67A}" type="datetimeFigureOut">
               <a:rPr lang="en-US" smtClean="0"/>
-              <a:t>7/2/2025</a:t>
+              <a:t>7/17/2025</a:t>
             </a:fld>
             <a:endParaRPr lang="en-US"/>
           </a:p>
@@ -763,7 +763,7 @@
           <a:p>
             <a:fld id="{62F28B94-1C21-420D-B146-10F377ADC67A}" type="datetimeFigureOut">
               <a:rPr lang="en-US" smtClean="0"/>
-              <a:t>7/2/2025</a:t>
+              <a:t>7/17/2025</a:t>
             </a:fld>
             <a:endParaRPr lang="en-US"/>
           </a:p>
@@ -1009,7 +1009,7 @@
           <a:p>
             <a:fld id="{62F28B94-1C21-420D-B146-10F377ADC67A}" type="datetimeFigureOut">
               <a:rPr lang="en-US" smtClean="0"/>
-              <a:t>7/2/2025</a:t>
+              <a:t>7/17/2025</a:t>
             </a:fld>
             <a:endParaRPr lang="en-US"/>
           </a:p>
@@ -1241,7 +1241,7 @@
           <a:p>
             <a:fld id="{62F28B94-1C21-420D-B146-10F377ADC67A}" type="datetimeFigureOut">
               <a:rPr lang="en-US" smtClean="0"/>
-              <a:t>7/2/2025</a:t>
+              <a:t>7/17/2025</a:t>
             </a:fld>
             <a:endParaRPr lang="en-US"/>
           </a:p>
@@ -1608,7 +1608,7 @@
           <a:p>
             <a:fld id="{62F28B94-1C21-420D-B146-10F377ADC67A}" type="datetimeFigureOut">
               <a:rPr lang="en-US" smtClean="0"/>
-              <a:t>7/2/2025</a:t>
+              <a:t>7/17/2025</a:t>
             </a:fld>
             <a:endParaRPr lang="en-US"/>
           </a:p>
@@ -1726,7 +1726,7 @@
           <a:p>
             <a:fld id="{62F28B94-1C21-420D-B146-10F377ADC67A}" type="datetimeFigureOut">
               <a:rPr lang="en-US" smtClean="0"/>
-              <a:t>7/2/2025</a:t>
+              <a:t>7/17/2025</a:t>
             </a:fld>
             <a:endParaRPr lang="en-US"/>
           </a:p>
@@ -1821,7 +1821,7 @@
           <a:p>
             <a:fld id="{62F28B94-1C21-420D-B146-10F377ADC67A}" type="datetimeFigureOut">
               <a:rPr lang="en-US" smtClean="0"/>
-              <a:t>7/2/2025</a:t>
+              <a:t>7/17/2025</a:t>
             </a:fld>
             <a:endParaRPr lang="en-US"/>
           </a:p>
@@ -2098,7 +2098,7 @@
           <a:p>
             <a:fld id="{62F28B94-1C21-420D-B146-10F377ADC67A}" type="datetimeFigureOut">
               <a:rPr lang="en-US" smtClean="0"/>
-              <a:t>7/2/2025</a:t>
+              <a:t>7/17/2025</a:t>
             </a:fld>
             <a:endParaRPr lang="en-US"/>
           </a:p>
@@ -2355,7 +2355,7 @@
           <a:p>
             <a:fld id="{62F28B94-1C21-420D-B146-10F377ADC67A}" type="datetimeFigureOut">
               <a:rPr lang="en-US" smtClean="0"/>
-              <a:t>7/2/2025</a:t>
+              <a:t>7/17/2025</a:t>
             </a:fld>
             <a:endParaRPr lang="en-US"/>
           </a:p>
@@ -2568,7 +2568,7 @@
           <a:p>
             <a:fld id="{62F28B94-1C21-420D-B146-10F377ADC67A}" type="datetimeFigureOut">
               <a:rPr lang="en-US" smtClean="0"/>
-              <a:t>7/2/2025</a:t>
+              <a:t>7/17/2025</a:t>
             </a:fld>
             <a:endParaRPr lang="en-US"/>
           </a:p>
@@ -2989,15 +2989,15 @@
         </p:nvPicPr>
         <p:blipFill>
           <a:blip r:embed="rId2"/>
-          <a:srcRect r="75444"/>
+          <a:srcRect t="19601" r="75444"/>
           <a:stretch>
             <a:fillRect/>
           </a:stretch>
         </p:blipFill>
         <p:spPr>
           <a:xfrm>
-            <a:off x="235013" y="590238"/>
-            <a:ext cx="1542504" cy="1238259"/>
+            <a:off x="235013" y="832955"/>
+            <a:ext cx="1542504" cy="995542"/>
           </a:xfrm>
           <a:prstGeom prst="rect">
             <a:avLst/>
@@ -4210,7 +4210,7 @@
         </p:blipFill>
         <p:spPr>
           <a:xfrm>
-            <a:off x="2843360" y="844550"/>
+            <a:off x="3038092" y="844550"/>
             <a:ext cx="427576" cy="843993"/>
           </a:xfrm>
           <a:prstGeom prst="rect">
@@ -4378,13 +4378,14 @@
           <p:cNvCxnSpPr>
             <a:cxnSpLocks/>
             <a:stCxn id="49" idx="1"/>
+            <a:endCxn id="18" idx="0"/>
           </p:cNvCxnSpPr>
           <p:nvPr/>
         </p:nvCxnSpPr>
         <p:spPr>
           <a:xfrm flipH="1" flipV="1">
-            <a:off x="2875810" y="1721260"/>
-            <a:ext cx="275519" cy="875558"/>
+            <a:off x="3067444" y="1742156"/>
+            <a:ext cx="83885" cy="854662"/>
           </a:xfrm>
           <a:prstGeom prst="line">
             <a:avLst/>
@@ -4427,8 +4428,8 @@
         </p:nvCxnSpPr>
         <p:spPr>
           <a:xfrm flipH="1" flipV="1">
-            <a:off x="3008505" y="1804057"/>
-            <a:ext cx="243754" cy="710543"/>
+            <a:off x="3203237" y="1804057"/>
+            <a:ext cx="44801" cy="705894"/>
           </a:xfrm>
           <a:prstGeom prst="line">
             <a:avLst/>
@@ -4471,9 +4472,9 @@
           <p:nvPr/>
         </p:nvCxnSpPr>
         <p:spPr>
-          <a:xfrm flipH="1" flipV="1">
-            <a:off x="3213350" y="1807231"/>
-            <a:ext cx="109429" cy="792762"/>
+          <a:xfrm flipV="1">
+            <a:off x="3322779" y="1807231"/>
+            <a:ext cx="85303" cy="792762"/>
           </a:xfrm>
           <a:prstGeom prst="line">
             <a:avLst/>
@@ -4515,15 +4516,15 @@
         </p:nvPicPr>
         <p:blipFill>
           <a:blip r:embed="rId2"/>
-          <a:srcRect l="25066"/>
+          <a:srcRect l="25066" t="19504" r="67722" b="8757"/>
           <a:stretch>
             <a:fillRect/>
           </a:stretch>
         </p:blipFill>
         <p:spPr>
           <a:xfrm>
-            <a:off x="3744534" y="603895"/>
-            <a:ext cx="4707165" cy="1238259"/>
+            <a:off x="4182789" y="832955"/>
+            <a:ext cx="453054" cy="888306"/>
           </a:xfrm>
           <a:prstGeom prst="rect">
             <a:avLst/>
@@ -4544,7 +4545,7 @@
         </p:nvSpPr>
         <p:spPr>
           <a:xfrm rot="5400000" flipV="1">
-            <a:off x="2977554" y="1637313"/>
+            <a:off x="3172286" y="1637313"/>
             <a:ext cx="61901" cy="271586"/>
           </a:xfrm>
           <a:prstGeom prst="rightBrace">
@@ -4593,7 +4594,7 @@
         </p:nvSpPr>
         <p:spPr>
           <a:xfrm rot="5400000" flipV="1">
-            <a:off x="3176130" y="1711943"/>
+            <a:off x="3370862" y="1711943"/>
             <a:ext cx="74439" cy="116137"/>
           </a:xfrm>
           <a:prstGeom prst="rightBrace">
@@ -4642,7 +4643,7 @@
         </p:nvSpPr>
         <p:spPr>
           <a:xfrm>
-            <a:off x="2737570" y="963071"/>
+            <a:off x="2932302" y="963071"/>
             <a:ext cx="427576" cy="294480"/>
           </a:xfrm>
           <a:prstGeom prst="rect">
@@ -4680,6 +4681,68 @@
           </a:p>
         </p:txBody>
       </p:sp>
+      <p:pic>
+        <p:nvPicPr>
+          <p:cNvPr id="3" name="Picture 2">
+            <a:extLst>
+              <a:ext uri="{FF2B5EF4-FFF2-40B4-BE49-F238E27FC236}">
+                <a16:creationId xmlns:a16="http://schemas.microsoft.com/office/drawing/2014/main" id="{3CEFA0AF-295C-2105-FDA4-93CCD30202DA}"/>
+              </a:ext>
+            </a:extLst>
+          </p:cNvPr>
+          <p:cNvPicPr>
+            <a:picLocks noChangeAspect="1"/>
+          </p:cNvPicPr>
+          <p:nvPr/>
+        </p:nvPicPr>
+        <p:blipFill>
+          <a:blip r:embed="rId2"/>
+          <a:srcRect l="31906"/>
+          <a:stretch>
+            <a:fillRect/>
+          </a:stretch>
+        </p:blipFill>
+        <p:spPr>
+          <a:xfrm>
+            <a:off x="1522332" y="5162103"/>
+            <a:ext cx="4277482" cy="1238259"/>
+          </a:xfrm>
+          <a:prstGeom prst="rect">
+            <a:avLst/>
+          </a:prstGeom>
+        </p:spPr>
+      </p:pic>
+      <p:pic>
+        <p:nvPicPr>
+          <p:cNvPr id="6" name="Picture 5">
+            <a:extLst>
+              <a:ext uri="{FF2B5EF4-FFF2-40B4-BE49-F238E27FC236}">
+                <a16:creationId xmlns:a16="http://schemas.microsoft.com/office/drawing/2014/main" id="{D60772B6-E3F7-EB0F-60F4-F84772FA74D8}"/>
+              </a:ext>
+            </a:extLst>
+          </p:cNvPr>
+          <p:cNvPicPr>
+            <a:picLocks noChangeAspect="1"/>
+          </p:cNvPicPr>
+          <p:nvPr/>
+        </p:nvPicPr>
+        <p:blipFill>
+          <a:blip r:embed="rId3"/>
+          <a:srcRect l="78163" r="1745"/>
+          <a:stretch>
+            <a:fillRect/>
+          </a:stretch>
+        </p:blipFill>
+        <p:spPr>
+          <a:xfrm>
+            <a:off x="2887526" y="6870568"/>
+            <a:ext cx="1257300" cy="1971689"/>
+          </a:xfrm>
+          <a:prstGeom prst="rect">
+            <a:avLst/>
+          </a:prstGeom>
+        </p:spPr>
+      </p:pic>
     </p:spTree>
     <p:extLst>
       <p:ext uri="{BB962C8B-B14F-4D97-AF65-F5344CB8AC3E}">

</xml_diff>

<commit_message>
some editing; some files moved
</commit_message>
<xml_diff>
--- a/Main figures/fig1-sup-sketch.pptx
+++ b/Main figures/fig1-sup-sketch.pptx
@@ -243,7 +243,7 @@
           <a:p>
             <a:fld id="{62F28B94-1C21-420D-B146-10F377ADC67A}" type="datetimeFigureOut">
               <a:rPr lang="en-US" smtClean="0"/>
-              <a:t>7/17/2025</a:t>
+              <a:t>9/23/2025</a:t>
             </a:fld>
             <a:endParaRPr lang="en-US"/>
           </a:p>
@@ -413,7 +413,7 @@
           <a:p>
             <a:fld id="{62F28B94-1C21-420D-B146-10F377ADC67A}" type="datetimeFigureOut">
               <a:rPr lang="en-US" smtClean="0"/>
-              <a:t>7/17/2025</a:t>
+              <a:t>9/23/2025</a:t>
             </a:fld>
             <a:endParaRPr lang="en-US"/>
           </a:p>
@@ -593,7 +593,7 @@
           <a:p>
             <a:fld id="{62F28B94-1C21-420D-B146-10F377ADC67A}" type="datetimeFigureOut">
               <a:rPr lang="en-US" smtClean="0"/>
-              <a:t>7/17/2025</a:t>
+              <a:t>9/23/2025</a:t>
             </a:fld>
             <a:endParaRPr lang="en-US"/>
           </a:p>
@@ -763,7 +763,7 @@
           <a:p>
             <a:fld id="{62F28B94-1C21-420D-B146-10F377ADC67A}" type="datetimeFigureOut">
               <a:rPr lang="en-US" smtClean="0"/>
-              <a:t>7/17/2025</a:t>
+              <a:t>9/23/2025</a:t>
             </a:fld>
             <a:endParaRPr lang="en-US"/>
           </a:p>
@@ -1009,7 +1009,7 @@
           <a:p>
             <a:fld id="{62F28B94-1C21-420D-B146-10F377ADC67A}" type="datetimeFigureOut">
               <a:rPr lang="en-US" smtClean="0"/>
-              <a:t>7/17/2025</a:t>
+              <a:t>9/23/2025</a:t>
             </a:fld>
             <a:endParaRPr lang="en-US"/>
           </a:p>
@@ -1241,7 +1241,7 @@
           <a:p>
             <a:fld id="{62F28B94-1C21-420D-B146-10F377ADC67A}" type="datetimeFigureOut">
               <a:rPr lang="en-US" smtClean="0"/>
-              <a:t>7/17/2025</a:t>
+              <a:t>9/23/2025</a:t>
             </a:fld>
             <a:endParaRPr lang="en-US"/>
           </a:p>
@@ -1608,7 +1608,7 @@
           <a:p>
             <a:fld id="{62F28B94-1C21-420D-B146-10F377ADC67A}" type="datetimeFigureOut">
               <a:rPr lang="en-US" smtClean="0"/>
-              <a:t>7/17/2025</a:t>
+              <a:t>9/23/2025</a:t>
             </a:fld>
             <a:endParaRPr lang="en-US"/>
           </a:p>
@@ -1726,7 +1726,7 @@
           <a:p>
             <a:fld id="{62F28B94-1C21-420D-B146-10F377ADC67A}" type="datetimeFigureOut">
               <a:rPr lang="en-US" smtClean="0"/>
-              <a:t>7/17/2025</a:t>
+              <a:t>9/23/2025</a:t>
             </a:fld>
             <a:endParaRPr lang="en-US"/>
           </a:p>
@@ -1821,7 +1821,7 @@
           <a:p>
             <a:fld id="{62F28B94-1C21-420D-B146-10F377ADC67A}" type="datetimeFigureOut">
               <a:rPr lang="en-US" smtClean="0"/>
-              <a:t>7/17/2025</a:t>
+              <a:t>9/23/2025</a:t>
             </a:fld>
             <a:endParaRPr lang="en-US"/>
           </a:p>
@@ -2098,7 +2098,7 @@
           <a:p>
             <a:fld id="{62F28B94-1C21-420D-B146-10F377ADC67A}" type="datetimeFigureOut">
               <a:rPr lang="en-US" smtClean="0"/>
-              <a:t>7/17/2025</a:t>
+              <a:t>9/23/2025</a:t>
             </a:fld>
             <a:endParaRPr lang="en-US"/>
           </a:p>
@@ -2355,7 +2355,7 @@
           <a:p>
             <a:fld id="{62F28B94-1C21-420D-B146-10F377ADC67A}" type="datetimeFigureOut">
               <a:rPr lang="en-US" smtClean="0"/>
-              <a:t>7/17/2025</a:t>
+              <a:t>9/23/2025</a:t>
             </a:fld>
             <a:endParaRPr lang="en-US"/>
           </a:p>
@@ -2568,7 +2568,7 @@
           <a:p>
             <a:fld id="{62F28B94-1C21-420D-B146-10F377ADC67A}" type="datetimeFigureOut">
               <a:rPr lang="en-US" smtClean="0"/>
-              <a:t>7/17/2025</a:t>
+              <a:t>9/23/2025</a:t>
             </a:fld>
             <a:endParaRPr lang="en-US"/>
           </a:p>
@@ -3020,14 +3020,15 @@
         </p:nvPicPr>
         <p:blipFill>
           <a:blip r:embed="rId3"/>
+          <a:srcRect r="21842"/>
           <a:stretch>
             <a:fillRect/>
           </a:stretch>
         </p:blipFill>
         <p:spPr>
           <a:xfrm>
-            <a:off x="300014" y="2659956"/>
-            <a:ext cx="6257971" cy="1971689"/>
+            <a:off x="300015" y="2659956"/>
+            <a:ext cx="4891098" cy="1971689"/>
           </a:xfrm>
           <a:prstGeom prst="rect">
             <a:avLst/>
@@ -4728,15 +4729,15 @@
         </p:nvPicPr>
         <p:blipFill>
           <a:blip r:embed="rId3"/>
-          <a:srcRect l="78163" r="1745"/>
+          <a:srcRect l="78292" r="1138"/>
           <a:stretch>
             <a:fillRect/>
           </a:stretch>
         </p:blipFill>
         <p:spPr>
           <a:xfrm>
-            <a:off x="2887526" y="6870568"/>
-            <a:ext cx="1257300" cy="1971689"/>
+            <a:off x="2895600" y="6870568"/>
+            <a:ext cx="1287190" cy="1971689"/>
           </a:xfrm>
           <a:prstGeom prst="rect">
             <a:avLst/>

</xml_diff>